<commit_message>
Changes in the slides documenting the architecture
</commit_message>
<xml_diff>
--- a/Documentation/RJDemetra tools for statistical production.pptx
+++ b/Documentation/RJDemetra tools for statistical production.pptx
@@ -290,7 +290,7 @@
               <a:pPr>
                 <a:defRPr/>
               </a:pPr>
-              <a:t>4/26/2024</a:t>
+              <a:t>6/14/2024</a:t>
             </a:fld>
             <a:endParaRPr lang="en-US"/>
           </a:p>
@@ -13908,7 +13908,7 @@
                   <a:srgbClr val="C00000"/>
                 </a:solidFill>
               </a:rPr>
-              <a:t>PROVIDERS</a:t>
+              <a:t>DATA_READERS</a:t>
             </a:r>
           </a:p>
         </p:txBody>
@@ -13921,8 +13921,8 @@
         </p:nvSpPr>
         <p:spPr>
           <a:xfrm>
-            <a:off x="1786270" y="6282163"/>
-            <a:ext cx="5879804" cy="646331"/>
+            <a:off x="1359636" y="6275710"/>
+            <a:ext cx="7049386" cy="646331"/>
           </a:xfrm>
           <a:prstGeom prst="rect">
             <a:avLst/>
@@ -13944,12 +13944,12 @@
               <a:t>c ("</a:t>
             </a:r>
             <a:r>
-              <a:rPr lang="it-IT" b="1" dirty="0">
+              <a:rPr lang="it-IT" b="1" dirty="0" err="1" smtClean="0">
                 <a:solidFill>
                   <a:srgbClr val="C00000"/>
                 </a:solidFill>
               </a:rPr>
-              <a:t>Provider</a:t>
+              <a:t>Data_reader</a:t>
             </a:r>
             <a:r>
               <a:rPr lang="it-IT" b="1" dirty="0" smtClean="0">
@@ -13965,15 +13965,15 @@
                   <a:srgbClr val="C00000"/>
                 </a:solidFill>
               </a:rPr>
-              <a:t>Provider_ext_reg</a:t>
-            </a:r>
-            <a:r>
-              <a:rPr lang="it-IT" b="1" dirty="0" smtClean="0">
+              <a:t>Data_reader_ext_reg</a:t>
+            </a:r>
+            <a:r>
+              <a:rPr lang="it-IT" b="1" smtClean="0">
                 <a:solidFill>
                   <a:srgbClr val="C00000"/>
                 </a:solidFill>
               </a:rPr>
-              <a:t>)</a:t>
+              <a:t>")</a:t>
             </a:r>
             <a:endParaRPr lang="it-IT" b="1" dirty="0">
               <a:solidFill>
@@ -14054,24 +14054,20 @@
               <a:t> (</a:t>
             </a:r>
             <a:r>
-              <a:rPr lang="it-IT" sz="1400" dirty="0" err="1"/>
-              <a:t>input_data_provider</a:t>
+              <a:rPr lang="it-IT" sz="1400" dirty="0" err="1" smtClean="0"/>
+              <a:t>input_data_reader</a:t>
             </a:r>
             <a:r>
               <a:rPr lang="it-IT" sz="1400" dirty="0" smtClean="0"/>
               <a:t>,  </a:t>
             </a:r>
             <a:r>
-              <a:rPr lang="it-IT" sz="1400" dirty="0" err="1"/>
-              <a:t>ext_reg_provider</a:t>
-            </a:r>
-            <a:r>
-              <a:rPr lang="it-IT" sz="1400" dirty="0"/>
-              <a:t>, </a:t>
+              <a:rPr lang="it-IT" sz="1400" dirty="0" err="1" smtClean="0"/>
+              <a:t>ext_reg_data_reader</a:t>
             </a:r>
             <a:r>
               <a:rPr lang="it-IT" sz="1400" dirty="0" smtClean="0"/>
-              <a:t> </a:t>
+              <a:t>,  </a:t>
             </a:r>
             <a:r>
               <a:rPr lang="it-IT" sz="1400" dirty="0" err="1" smtClean="0"/>
@@ -14707,8 +14703,8 @@
         </p:nvSpPr>
         <p:spPr>
           <a:xfrm>
-            <a:off x="2559102" y="4186693"/>
-            <a:ext cx="1321778" cy="400110"/>
+            <a:off x="2559101" y="4186693"/>
+            <a:ext cx="1864687" cy="400110"/>
           </a:xfrm>
           <a:prstGeom prst="rect">
             <a:avLst/>
@@ -14728,7 +14724,7 @@
                   <a:srgbClr val="C00000"/>
                 </a:solidFill>
               </a:rPr>
-              <a:t>Providers</a:t>
+              <a:t>Data_readers</a:t>
             </a:r>
           </a:p>
         </p:txBody>
@@ -17565,7 +17561,7 @@
                   <a:srgbClr val="C00000"/>
                 </a:solidFill>
               </a:rPr>
-              <a:t> Providers</a:t>
+              <a:t> Data Readers</a:t>
             </a:r>
             <a:endParaRPr lang="it-IT" altLang="it-IT" sz="3600" dirty="0">
               <a:solidFill>
@@ -18124,8 +18120,8 @@
         </p:nvSpPr>
         <p:spPr>
           <a:xfrm>
-            <a:off x="2400300" y="1802119"/>
-            <a:ext cx="2768600" cy="359263"/>
+            <a:off x="2400299" y="1802120"/>
+            <a:ext cx="3298751" cy="356290"/>
           </a:xfrm>
           <a:prstGeom prst="rect">
             <a:avLst/>
@@ -18154,7 +18150,7 @@
             <a:pPr algn="ctr"/>
             <a:r>
               <a:rPr lang="it-IT" dirty="0" err="1" smtClean="0"/>
-              <a:t>Provider_ext_reg_CSV</a:t>
+              <a:t>Data_reader_ext_reg_CSV</a:t>
             </a:r>
             <a:endParaRPr lang="it-IT" dirty="0"/>
           </a:p>
@@ -18168,8 +18164,8 @@
         </p:nvSpPr>
         <p:spPr>
           <a:xfrm>
-            <a:off x="2400300" y="2345533"/>
-            <a:ext cx="2768600" cy="359263"/>
+            <a:off x="2400300" y="2351030"/>
+            <a:ext cx="3247950" cy="360744"/>
           </a:xfrm>
           <a:prstGeom prst="rect">
             <a:avLst/>
@@ -18197,8 +18193,8 @@
           <a:p>
             <a:pPr algn="ctr"/>
             <a:r>
-              <a:rPr lang="it-IT" dirty="0" err="1" smtClean="0"/>
-              <a:t>Provider_ext_reg_TXT</a:t>
+              <a:rPr lang="it-IT" dirty="0" err="1"/>
+              <a:t>Data_reader_ext_reg_TXT</a:t>
             </a:r>
             <a:endParaRPr lang="it-IT" dirty="0"/>
           </a:p>
@@ -18212,8 +18208,8 @@
         </p:nvSpPr>
         <p:spPr>
           <a:xfrm>
-            <a:off x="2400300" y="2902464"/>
-            <a:ext cx="2768600" cy="355485"/>
+            <a:off x="2400300" y="2892217"/>
+            <a:ext cx="3258588" cy="317249"/>
           </a:xfrm>
           <a:prstGeom prst="rect">
             <a:avLst/>
@@ -18241,8 +18237,8 @@
           <a:p>
             <a:pPr algn="ctr"/>
             <a:r>
-              <a:rPr lang="it-IT" dirty="0" err="1" smtClean="0"/>
-              <a:t>Provider_ext_reg_ws</a:t>
+              <a:rPr lang="it-IT" dirty="0" err="1"/>
+              <a:t>Data_reader_ext_reg_ws</a:t>
             </a:r>
             <a:endParaRPr lang="it-IT" dirty="0"/>
           </a:p>
@@ -18256,8 +18252,8 @@
         </p:nvSpPr>
         <p:spPr>
           <a:xfrm>
-            <a:off x="2400300" y="3415316"/>
-            <a:ext cx="2768600" cy="359263"/>
+            <a:off x="2400299" y="3394051"/>
+            <a:ext cx="3298751" cy="348629"/>
           </a:xfrm>
           <a:prstGeom prst="rect">
             <a:avLst/>
@@ -18294,14 +18290,22 @@
           <a:p>
             <a:pPr algn="ctr"/>
             <a:r>
-              <a:rPr lang="it-IT" sz="1700" dirty="0" err="1" smtClean="0">
+              <a:rPr lang="it-IT" dirty="0" err="1">
                 <a:solidFill>
                   <a:schemeClr val="tx1"/>
                 </a:solidFill>
               </a:rPr>
-              <a:t>Provider_ext_reg_CUSTOM</a:t>
-            </a:r>
-            <a:endParaRPr lang="it-IT" sz="1700" dirty="0">
+              <a:t>Data_reader</a:t>
+            </a:r>
+            <a:r>
+              <a:rPr lang="it-IT" dirty="0" err="1" smtClean="0">
+                <a:solidFill>
+                  <a:schemeClr val="tx1"/>
+                </a:solidFill>
+              </a:rPr>
+              <a:t>_ext_reg_CUSTOM</a:t>
+            </a:r>
+            <a:endParaRPr lang="it-IT" dirty="0">
               <a:solidFill>
                 <a:schemeClr val="tx1"/>
               </a:solidFill>
@@ -18319,9 +18323,9 @@
           <p:nvPr/>
         </p:nvCxnSpPr>
         <p:spPr>
-          <a:xfrm>
-            <a:off x="1811701" y="1981751"/>
-            <a:ext cx="588599" cy="0"/>
+          <a:xfrm flipV="1">
+            <a:off x="1811701" y="1980265"/>
+            <a:ext cx="588598" cy="1486"/>
           </a:xfrm>
           <a:prstGeom prst="straightConnector1">
             <a:avLst/>
@@ -18503,7 +18507,7 @@
                   <a:schemeClr val="tx1"/>
                 </a:solidFill>
               </a:rPr>
-              <a:t>Provider_CSV</a:t>
+              <a:t>Data_reader_CSV</a:t>
             </a:r>
             <a:endParaRPr lang="it-IT" dirty="0">
               <a:solidFill>
@@ -18560,7 +18564,7 @@
                   <a:schemeClr val="tx1"/>
                 </a:solidFill>
               </a:rPr>
-              <a:t>Provider_TXT</a:t>
+              <a:t>Data_reader_TXT</a:t>
             </a:r>
             <a:endParaRPr lang="it-IT" dirty="0">
               <a:solidFill>
@@ -18620,7 +18624,7 @@
                   <a:schemeClr val="tx1"/>
                 </a:solidFill>
               </a:rPr>
-              <a:t>Provider_CUSTOM</a:t>
+              <a:t>Data_reader_CUSTOM</a:t>
             </a:r>
             <a:endParaRPr lang="it-IT" dirty="0">
               <a:solidFill>
@@ -18863,7 +18867,7 @@
             <a:pPr algn="ctr"/>
             <a:r>
               <a:rPr lang="it-IT" dirty="0" err="1" smtClean="0"/>
-              <a:t>Ext_reg_provider</a:t>
+              <a:t>Ext_reg_data_reader</a:t>
             </a:r>
             <a:endParaRPr lang="it-IT" dirty="0"/>
           </a:p>
@@ -18916,7 +18920,7 @@
                   <a:schemeClr val="tx1"/>
                 </a:solidFill>
               </a:rPr>
-              <a:t>Input_data_provider</a:t>
+              <a:t>Input_data_reader</a:t>
             </a:r>
             <a:endParaRPr lang="it-IT" dirty="0">
               <a:solidFill>
@@ -18934,7 +18938,7 @@
         </p:nvSpPr>
         <p:spPr>
           <a:xfrm>
-            <a:off x="5168900" y="1802119"/>
+            <a:off x="5658888" y="1802119"/>
             <a:ext cx="101600" cy="359263"/>
           </a:xfrm>
           <a:prstGeom prst="rect">
@@ -18982,7 +18986,7 @@
         </p:nvSpPr>
         <p:spPr>
           <a:xfrm>
-            <a:off x="5168900" y="3415019"/>
+            <a:off x="5648256" y="3380188"/>
             <a:ext cx="101600" cy="359560"/>
           </a:xfrm>
           <a:prstGeom prst="rect">
@@ -19078,8 +19082,8 @@
         </p:nvSpPr>
         <p:spPr>
           <a:xfrm>
-            <a:off x="7010400" y="5545970"/>
-            <a:ext cx="4000500" cy="461665"/>
+            <a:off x="7010399" y="5545970"/>
+            <a:ext cx="4727575" cy="461665"/>
           </a:xfrm>
           <a:prstGeom prst="rect">
             <a:avLst/>
@@ -19097,7 +19101,7 @@
           <a:p>
             <a:r>
               <a:rPr lang="it-IT" sz="2400" dirty="0" err="1" smtClean="0"/>
-              <a:t>Provider_ext_reg</a:t>
+              <a:t>Data_reader_ext_reg</a:t>
             </a:r>
             <a:r>
               <a:rPr lang="it-IT" sz="2400" dirty="0" smtClean="0"/>
@@ -19329,8 +19333,12 @@
           <a:lstStyle/>
           <a:p>
             <a:r>
+              <a:rPr lang="it-IT" sz="2400" dirty="0" err="1" smtClean="0"/>
+              <a:t>Data_reader</a:t>
+            </a:r>
+            <a:r>
               <a:rPr lang="it-IT" sz="2400" dirty="0" smtClean="0"/>
-              <a:t>Provider </a:t>
+              <a:t> </a:t>
             </a:r>
             <a:r>
               <a:rPr lang="it-IT" sz="2400" dirty="0" err="1" smtClean="0"/>
@@ -19376,42 +19384,6 @@
           </a:fontRef>
         </p:style>
       </p:cxnSp>
-      <p:cxnSp>
-        <p:nvCxnSpPr>
-          <p:cNvPr id="60" name="Connettore 4 59"/>
-          <p:cNvCxnSpPr/>
-          <p:nvPr/>
-        </p:nvCxnSpPr>
-        <p:spPr>
-          <a:xfrm>
-            <a:off x="5600700" y="2500612"/>
-            <a:ext cx="977900" cy="974777"/>
-          </a:xfrm>
-          <a:prstGeom prst="bentConnector3">
-            <a:avLst/>
-          </a:prstGeom>
-          <a:ln w="25400">
-            <a:solidFill>
-              <a:schemeClr val="tx1"/>
-            </a:solidFill>
-            <a:tailEnd type="triangle" w="lg" len="lg"/>
-          </a:ln>
-        </p:spPr>
-        <p:style>
-          <a:lnRef idx="1">
-            <a:schemeClr val="accent1"/>
-          </a:lnRef>
-          <a:fillRef idx="0">
-            <a:schemeClr val="accent1"/>
-          </a:fillRef>
-          <a:effectRef idx="0">
-            <a:schemeClr val="accent1"/>
-          </a:effectRef>
-          <a:fontRef idx="minor">
-            <a:schemeClr val="tx1"/>
-          </a:fontRef>
-        </p:style>
-      </p:cxnSp>
       <p:sp>
         <p:nvSpPr>
           <p:cNvPr id="63" name="Rettangolo 62"/>
@@ -19420,7 +19392,7 @@
         </p:nvSpPr>
         <p:spPr>
           <a:xfrm>
-            <a:off x="5168900" y="2348219"/>
+            <a:off x="5648250" y="2348219"/>
             <a:ext cx="101600" cy="359263"/>
           </a:xfrm>
           <a:prstGeom prst="rect">
@@ -19468,8 +19440,8 @@
         </p:nvSpPr>
         <p:spPr>
           <a:xfrm>
-            <a:off x="5168900" y="2907019"/>
-            <a:ext cx="101600" cy="359263"/>
+            <a:off x="5648256" y="2887115"/>
+            <a:ext cx="108125" cy="322351"/>
           </a:xfrm>
           <a:prstGeom prst="rect">
             <a:avLst/>
@@ -19604,6 +19576,42 @@
           </a:p>
         </p:txBody>
       </p:sp>
+      <p:cxnSp>
+        <p:nvCxnSpPr>
+          <p:cNvPr id="45" name="Connettore 2 44"/>
+          <p:cNvCxnSpPr/>
+          <p:nvPr/>
+        </p:nvCxnSpPr>
+        <p:spPr>
+          <a:xfrm flipV="1">
+            <a:off x="6049926" y="3474251"/>
+            <a:ext cx="528674" cy="2596"/>
+          </a:xfrm>
+          <a:prstGeom prst="straightConnector1">
+            <a:avLst/>
+          </a:prstGeom>
+          <a:ln w="15875">
+            <a:solidFill>
+              <a:schemeClr val="tx1"/>
+            </a:solidFill>
+            <a:tailEnd type="triangle" w="lg" len="lg"/>
+          </a:ln>
+        </p:spPr>
+        <p:style>
+          <a:lnRef idx="1">
+            <a:schemeClr val="accent1"/>
+          </a:lnRef>
+          <a:fillRef idx="0">
+            <a:schemeClr val="accent1"/>
+          </a:fillRef>
+          <a:effectRef idx="0">
+            <a:schemeClr val="accent1"/>
+          </a:effectRef>
+          <a:fontRef idx="minor">
+            <a:schemeClr val="tx1"/>
+          </a:fontRef>
+        </p:style>
+      </p:cxnSp>
     </p:spTree>
     <p:extLst>
       <p:ext uri="{BB962C8B-B14F-4D97-AF65-F5344CB8AC3E}">
@@ -28499,80 +28507,6 @@
 </file>
 
 <file path=customXml/item1.xml><?xml version="1.0" encoding="utf-8"?>
-<?mso-contentType ?>
-<FormTemplates xmlns="http://schemas.microsoft.com/sharepoint/v3/contenttype/forms">
-  <Display>DocumentLibraryForm</Display>
-  <Edit>DocumentLibraryForm</Edit>
-  <New>DocumentLibraryForm</New>
-</FormTemplates>
-</file>
-
-<file path=customXml/item2.xml><?xml version="1.0" encoding="utf-8"?>
-<?mso-contentType ?>
-<spe:Receivers xmlns:spe="http://schemas.microsoft.com/sharepoint/events">
-  <Receiver>
-    <Name>Document ID Generator</Name>
-    <Synchronization>Synchronous</Synchronization>
-    <Type>10001</Type>
-    <SequenceNumber>1000</SequenceNumber>
-    <Url/>
-    <Assembly>Microsoft.Office.DocumentManagement, Version=15.0.0.0, Culture=neutral, PublicKeyToken=71e9bce111e9429c</Assembly>
-    <Class>Microsoft.Office.DocumentManagement.Internal.DocIdHandler</Class>
-    <Data/>
-    <Filter/>
-  </Receiver>
-  <Receiver>
-    <Name>Document ID Generator</Name>
-    <Synchronization>Synchronous</Synchronization>
-    <Type>10002</Type>
-    <SequenceNumber>1001</SequenceNumber>
-    <Url/>
-    <Assembly>Microsoft.Office.DocumentManagement, Version=15.0.0.0, Culture=neutral, PublicKeyToken=71e9bce111e9429c</Assembly>
-    <Class>Microsoft.Office.DocumentManagement.Internal.DocIdHandler</Class>
-    <Data/>
-    <Filter/>
-  </Receiver>
-  <Receiver>
-    <Name>Document ID Generator</Name>
-    <Synchronization>Synchronous</Synchronization>
-    <Type>10004</Type>
-    <SequenceNumber>1002</SequenceNumber>
-    <Url/>
-    <Assembly>Microsoft.Office.DocumentManagement, Version=15.0.0.0, Culture=neutral, PublicKeyToken=71e9bce111e9429c</Assembly>
-    <Class>Microsoft.Office.DocumentManagement.Internal.DocIdHandler</Class>
-    <Data/>
-    <Filter/>
-  </Receiver>
-  <Receiver>
-    <Name>Document ID Generator</Name>
-    <Synchronization>Synchronous</Synchronization>
-    <Type>10006</Type>
-    <SequenceNumber>1003</SequenceNumber>
-    <Url/>
-    <Assembly>Microsoft.Office.DocumentManagement, Version=15.0.0.0, Culture=neutral, PublicKeyToken=71e9bce111e9429c</Assembly>
-    <Class>Microsoft.Office.DocumentManagement.Internal.DocIdHandler</Class>
-    <Data/>
-    <Filter/>
-  </Receiver>
-</spe:Receivers>
-</file>
-
-<file path=customXml/item3.xml><?xml version="1.0" encoding="utf-8"?>
-<p:properties xmlns:p="http://schemas.microsoft.com/office/2006/metadata/properties" xmlns:xsi="http://www.w3.org/2001/XMLSchema-instance" xmlns:pc="http://schemas.microsoft.com/office/infopath/2007/PartnerControls">
-  <documentManagement>
-    <SottoCategoria xmlns="679261c3-551f-4e86-913f-177e0e529669">-</SottoCategoria>
-    <Categoria xmlns="c58f2efd-82a8-4ecf-b395-8c25e928921d">3- Standard presentazioni Power Point</Categoria>
-    <_dlc_DocId xmlns="459159c4-d20a-4ff3-9b11-fbd127bd52e5">INTRANET-14-174</_dlc_DocId>
-    <_dlc_DocIdUrl xmlns="459159c4-d20a-4ff3-9b11-fbd127bd52e5">
-      <Url>https://intranet.istat.it/Collaborativi/_layouts/15/DocIdRedir.aspx?ID=INTRANET-14-174</Url>
-      <Description>INTRANET-14-174</Description>
-    </_dlc_DocIdUrl>
-    <Ordine xmlns="679261c3-551f-4e86-913f-177e0e529669">1</Ordine>
-  </documentManagement>
-</p:properties>
-</file>
-
-<file path=customXml/item4.xml><?xml version="1.0" encoding="utf-8"?>
 <ct:contentTypeSchema xmlns:ct="http://schemas.microsoft.com/office/2006/metadata/contentType" xmlns:ma="http://schemas.microsoft.com/office/2006/metadata/properties/metaAttributes" ct:_="" ma:_="" ma:contentTypeName="Documento" ma:contentTypeID="0x010100661A2BE3120D674DA36C11D6006822D4" ma:contentTypeVersion="5" ma:contentTypeDescription="Creare un nuovo documento." ma:contentTypeScope="" ma:versionID="742e6049321d93803bb3bb587f561ffa">
   <xsd:schema xmlns:xsd="http://www.w3.org/2001/XMLSchema" xmlns:xs="http://www.w3.org/2001/XMLSchema" xmlns:p="http://schemas.microsoft.com/office/2006/metadata/properties" xmlns:ns2="c58f2efd-82a8-4ecf-b395-8c25e928921d" xmlns:ns3="459159c4-d20a-4ff3-9b11-fbd127bd52e5" xmlns:ns4="679261c3-551f-4e86-913f-177e0e529669" targetNamespace="http://schemas.microsoft.com/office/2006/metadata/properties" ma:root="true" ma:fieldsID="939ae4a7eaec2950db97a79ca38d2d4d" ns2:_="" ns3:_="" ns4:_="">
     <xsd:import namespace="c58f2efd-82a8-4ecf-b395-8c25e928921d"/>
@@ -28765,41 +28699,81 @@
 </ct:contentTypeSchema>
 </file>
 
-<file path=customXml/itemProps1.xml><?xml version="1.0" encoding="utf-8"?>
-<ds:datastoreItem xmlns:ds="http://schemas.openxmlformats.org/officeDocument/2006/customXml" ds:itemID="{BD9C238D-4D5C-4783-820B-4854DCE45D41}">
-  <ds:schemaRefs>
-    <ds:schemaRef ds:uri="http://schemas.microsoft.com/sharepoint/v3/contenttype/forms"/>
-  </ds:schemaRefs>
-</ds:datastoreItem>
+<file path=customXml/item2.xml><?xml version="1.0" encoding="utf-8"?>
+<?mso-contentType ?>
+<FormTemplates xmlns="http://schemas.microsoft.com/sharepoint/v3/contenttype/forms">
+  <Display>DocumentLibraryForm</Display>
+  <Edit>DocumentLibraryForm</Edit>
+  <New>DocumentLibraryForm</New>
+</FormTemplates>
 </file>
 
-<file path=customXml/itemProps2.xml><?xml version="1.0" encoding="utf-8"?>
-<ds:datastoreItem xmlns:ds="http://schemas.openxmlformats.org/officeDocument/2006/customXml" ds:itemID="{D9296C4F-9DE9-4B43-AA80-1FC85656CFFA}">
-  <ds:schemaRefs>
-    <ds:schemaRef ds:uri="http://schemas.microsoft.com/sharepoint/events"/>
-  </ds:schemaRefs>
-</ds:datastoreItem>
+<file path=customXml/item3.xml><?xml version="1.0" encoding="utf-8"?>
+<?mso-contentType ?>
+<spe:Receivers xmlns:spe="http://schemas.microsoft.com/sharepoint/events">
+  <Receiver>
+    <Name>Document ID Generator</Name>
+    <Synchronization>Synchronous</Synchronization>
+    <Type>10001</Type>
+    <SequenceNumber>1000</SequenceNumber>
+    <Url/>
+    <Assembly>Microsoft.Office.DocumentManagement, Version=15.0.0.0, Culture=neutral, PublicKeyToken=71e9bce111e9429c</Assembly>
+    <Class>Microsoft.Office.DocumentManagement.Internal.DocIdHandler</Class>
+    <Data/>
+    <Filter/>
+  </Receiver>
+  <Receiver>
+    <Name>Document ID Generator</Name>
+    <Synchronization>Synchronous</Synchronization>
+    <Type>10002</Type>
+    <SequenceNumber>1001</SequenceNumber>
+    <Url/>
+    <Assembly>Microsoft.Office.DocumentManagement, Version=15.0.0.0, Culture=neutral, PublicKeyToken=71e9bce111e9429c</Assembly>
+    <Class>Microsoft.Office.DocumentManagement.Internal.DocIdHandler</Class>
+    <Data/>
+    <Filter/>
+  </Receiver>
+  <Receiver>
+    <Name>Document ID Generator</Name>
+    <Synchronization>Synchronous</Synchronization>
+    <Type>10004</Type>
+    <SequenceNumber>1002</SequenceNumber>
+    <Url/>
+    <Assembly>Microsoft.Office.DocumentManagement, Version=15.0.0.0, Culture=neutral, PublicKeyToken=71e9bce111e9429c</Assembly>
+    <Class>Microsoft.Office.DocumentManagement.Internal.DocIdHandler</Class>
+    <Data/>
+    <Filter/>
+  </Receiver>
+  <Receiver>
+    <Name>Document ID Generator</Name>
+    <Synchronization>Synchronous</Synchronization>
+    <Type>10006</Type>
+    <SequenceNumber>1003</SequenceNumber>
+    <Url/>
+    <Assembly>Microsoft.Office.DocumentManagement, Version=15.0.0.0, Culture=neutral, PublicKeyToken=71e9bce111e9429c</Assembly>
+    <Class>Microsoft.Office.DocumentManagement.Internal.DocIdHandler</Class>
+    <Data/>
+    <Filter/>
+  </Receiver>
+</spe:Receivers>
 </file>
 
-<file path=customXml/itemProps3.xml><?xml version="1.0" encoding="utf-8"?>
-<ds:datastoreItem xmlns:ds="http://schemas.openxmlformats.org/officeDocument/2006/customXml" ds:itemID="{3EF378BC-F4D0-4510-B4EC-07B6EFE18CF8}">
-  <ds:schemaRefs>
-    <ds:schemaRef ds:uri="http://www.w3.org/XML/1998/namespace"/>
-    <ds:schemaRef ds:uri="http://schemas.microsoft.com/office/infopath/2007/PartnerControls"/>
-    <ds:schemaRef ds:uri="http://purl.org/dc/dcmitype/"/>
-    <ds:schemaRef ds:uri="http://schemas.microsoft.com/office/2006/metadata/properties"/>
-    <ds:schemaRef ds:uri="http://purl.org/dc/elements/1.1/"/>
-    <ds:schemaRef ds:uri="679261c3-551f-4e86-913f-177e0e529669"/>
-    <ds:schemaRef ds:uri="http://purl.org/dc/terms/"/>
-    <ds:schemaRef ds:uri="http://schemas.microsoft.com/office/2006/documentManagement/types"/>
-    <ds:schemaRef ds:uri="http://schemas.openxmlformats.org/package/2006/metadata/core-properties"/>
-    <ds:schemaRef ds:uri="459159c4-d20a-4ff3-9b11-fbd127bd52e5"/>
-    <ds:schemaRef ds:uri="c58f2efd-82a8-4ecf-b395-8c25e928921d"/>
-  </ds:schemaRefs>
-</ds:datastoreItem>
+<file path=customXml/item4.xml><?xml version="1.0" encoding="utf-8"?>
+<p:properties xmlns:p="http://schemas.microsoft.com/office/2006/metadata/properties" xmlns:xsi="http://www.w3.org/2001/XMLSchema-instance" xmlns:pc="http://schemas.microsoft.com/office/infopath/2007/PartnerControls">
+  <documentManagement>
+    <SottoCategoria xmlns="679261c3-551f-4e86-913f-177e0e529669">-</SottoCategoria>
+    <Categoria xmlns="c58f2efd-82a8-4ecf-b395-8c25e928921d">3- Standard presentazioni Power Point</Categoria>
+    <_dlc_DocId xmlns="459159c4-d20a-4ff3-9b11-fbd127bd52e5">INTRANET-14-174</_dlc_DocId>
+    <_dlc_DocIdUrl xmlns="459159c4-d20a-4ff3-9b11-fbd127bd52e5">
+      <Url>https://intranet.istat.it/Collaborativi/_layouts/15/DocIdRedir.aspx?ID=INTRANET-14-174</Url>
+      <Description>INTRANET-14-174</Description>
+    </_dlc_DocIdUrl>
+    <Ordine xmlns="679261c3-551f-4e86-913f-177e0e529669">1</Ordine>
+  </documentManagement>
+</p:properties>
 </file>
 
-<file path=customXml/itemProps4.xml><?xml version="1.0" encoding="utf-8"?>
+<file path=customXml/itemProps1.xml><?xml version="1.0" encoding="utf-8"?>
 <ds:datastoreItem xmlns:ds="http://schemas.openxmlformats.org/officeDocument/2006/customXml" ds:itemID="{AA760D03-2285-4F80-B9FC-1F4F97E97129}">
   <ds:schemaRefs>
     <ds:schemaRef ds:uri="http://schemas.microsoft.com/office/2006/metadata/contentType"/>
@@ -28817,4 +28791,38 @@
     <ds:schemaRef ds:uri="http://schemas.microsoft.com/internal/obd"/>
   </ds:schemaRefs>
 </ds:datastoreItem>
+</file>
+
+<file path=customXml/itemProps2.xml><?xml version="1.0" encoding="utf-8"?>
+<ds:datastoreItem xmlns:ds="http://schemas.openxmlformats.org/officeDocument/2006/customXml" ds:itemID="{BD9C238D-4D5C-4783-820B-4854DCE45D41}">
+  <ds:schemaRefs>
+    <ds:schemaRef ds:uri="http://schemas.microsoft.com/sharepoint/v3/contenttype/forms"/>
+  </ds:schemaRefs>
+</ds:datastoreItem>
+</file>
+
+<file path=customXml/itemProps3.xml><?xml version="1.0" encoding="utf-8"?>
+<ds:datastoreItem xmlns:ds="http://schemas.openxmlformats.org/officeDocument/2006/customXml" ds:itemID="{D9296C4F-9DE9-4B43-AA80-1FC85656CFFA}">
+  <ds:schemaRefs>
+    <ds:schemaRef ds:uri="http://schemas.microsoft.com/sharepoint/events"/>
+  </ds:schemaRefs>
+</ds:datastoreItem>
+</file>
+
+<file path=customXml/itemProps4.xml><?xml version="1.0" encoding="utf-8"?>
+<ds:datastoreItem xmlns:ds="http://schemas.openxmlformats.org/officeDocument/2006/customXml" ds:itemID="{3EF378BC-F4D0-4510-B4EC-07B6EFE18CF8}">
+  <ds:schemaRefs>
+    <ds:schemaRef ds:uri="c58f2efd-82a8-4ecf-b395-8c25e928921d"/>
+    <ds:schemaRef ds:uri="http://schemas.microsoft.com/office/2006/documentManagement/types"/>
+    <ds:schemaRef ds:uri="http://purl.org/dc/elements/1.1/"/>
+    <ds:schemaRef ds:uri="http://schemas.microsoft.com/office/infopath/2007/PartnerControls"/>
+    <ds:schemaRef ds:uri="679261c3-551f-4e86-913f-177e0e529669"/>
+    <ds:schemaRef ds:uri="http://schemas.openxmlformats.org/package/2006/metadata/core-properties"/>
+    <ds:schemaRef ds:uri="459159c4-d20a-4ff3-9b11-fbd127bd52e5"/>
+    <ds:schemaRef ds:uri="http://purl.org/dc/terms/"/>
+    <ds:schemaRef ds:uri="http://schemas.microsoft.com/office/2006/metadata/properties"/>
+    <ds:schemaRef ds:uri="http://www.w3.org/XML/1998/namespace"/>
+    <ds:schemaRef ds:uri="http://purl.org/dc/dcmitype/"/>
+  </ds:schemaRefs>
+</ds:datastoreItem>
 </file>
</xml_diff>